<commit_message>
added my notes to the slides
</commit_message>
<xml_diff>
--- a/Documents/Domain Track Presentation/Domain Presentation.pptx
+++ b/Documents/Domain Track Presentation/Domain Presentation.pptx
@@ -210,7 +210,7 @@
           <a:p>
             <a:fld id="{191D7E6F-5622-440D-AA54-F34C95BC6079}" type="datetimeFigureOut">
               <a:rPr lang="en-US" smtClean="0"/>
-              <a:t>5/14/2012</a:t>
+              <a:t>5/15/2012</a:t>
             </a:fld>
             <a:endParaRPr lang="en-US"/>
           </a:p>
@@ -376,7 +376,7 @@
           <a:p>
             <a:fld id="{04753B07-1A64-4147-85F4-5C87D1F4A9C3}" type="datetimeFigureOut">
               <a:rPr lang="en-US" smtClean="0"/>
-              <a:t>5/14/2012</a:t>
+              <a:t>5/15/2012</a:t>
             </a:fld>
             <a:endParaRPr lang="en-US"/>
           </a:p>
@@ -691,15 +691,7 @@
           <a:p>
             <a:r>
               <a:rPr lang="en-US" dirty="0" smtClean="0"/>
-              <a:t>Sources</a:t>
-            </a:r>
-            <a:r>
-              <a:rPr lang="en-US" dirty="0" smtClean="0"/>
-              <a:t>: http://</a:t>
-            </a:r>
-            <a:r>
-              <a:rPr lang="en-US" dirty="0" smtClean="0"/>
-              <a:t>www.rose-hulman.edu/Catalog1011/program-se.html</a:t>
+              <a:t>Sources: http://www.rose-hulman.edu/Catalog1011/program-se.html</a:t>
             </a:r>
           </a:p>
           <a:p>
@@ -818,11 +810,7 @@
           <a:p>
             <a:r>
               <a:rPr lang="en-US" dirty="0" smtClean="0"/>
-              <a:t>Sources: http://www.music-software-reviews.com/index.html, http://</a:t>
-            </a:r>
-            <a:r>
-              <a:rPr lang="en-US" dirty="0" smtClean="0"/>
-              <a:t>www.quora.com/Music-Recognition/What-are-the-best-music-recognition-technologies-products-or-services</a:t>
+              <a:t>Sources: http://www.music-software-reviews.com/index.html, http://www.quora.com/Music-Recognition/What-are-the-best-music-recognition-technologies-products-or-services</a:t>
             </a:r>
           </a:p>
           <a:p>
@@ -941,11 +929,7 @@
           <a:p>
             <a:r>
               <a:rPr lang="en-US" dirty="0" smtClean="0"/>
-              <a:t>Sources: http://</a:t>
-            </a:r>
-            <a:r>
-              <a:rPr lang="en-US" dirty="0" smtClean="0"/>
-              <a:t>www.pcworld.com/article/158300/microsoft_songsmith_bad_music_made_easy.html</a:t>
+              <a:t>Sources: http://www.pcworld.com/article/158300/microsoft_songsmith_bad_music_made_easy.html</a:t>
             </a:r>
           </a:p>
           <a:p>
@@ -1064,11 +1048,7 @@
           <a:p>
             <a:r>
               <a:rPr lang="en-US" dirty="0" smtClean="0"/>
-              <a:t>Sources: http://</a:t>
-            </a:r>
-            <a:r>
-              <a:rPr lang="en-US" dirty="0" smtClean="0"/>
-              <a:t>www.youtube.com/watch?v=xWYwY8GpuO0</a:t>
+              <a:t>Sources: http://www.youtube.com/watch?v=xWYwY8GpuO0</a:t>
             </a:r>
           </a:p>
           <a:p>
@@ -1191,11 +1171,7 @@
           <a:p>
             <a:r>
               <a:rPr lang="en-US" dirty="0" smtClean="0"/>
-              <a:t>Sources: http://www.aes.org</a:t>
-            </a:r>
-            <a:r>
-              <a:rPr lang="en-US" dirty="0" smtClean="0"/>
-              <a:t>/</a:t>
+              <a:t>Sources: http://www.aes.org/</a:t>
             </a:r>
           </a:p>
           <a:p>
@@ -1318,11 +1294,7 @@
             </a:r>
             <a:r>
               <a:rPr lang="en-US" baseline="0" dirty="0" smtClean="0"/>
-              <a:t> </a:t>
-            </a:r>
-            <a:r>
-              <a:rPr lang="en-US" baseline="0" dirty="0" smtClean="0"/>
-              <a:t>Me</a:t>
+              <a:t> Me</a:t>
             </a:r>
           </a:p>
           <a:p>
@@ -1441,11 +1413,7 @@
           <a:p>
             <a:r>
               <a:rPr lang="en-US" dirty="0" smtClean="0"/>
-              <a:t>Sources: </a:t>
-            </a:r>
-            <a:r>
-              <a:rPr lang="en-US" dirty="0" smtClean="0"/>
-              <a:t>Me</a:t>
+              <a:t>Sources: Me</a:t>
             </a:r>
           </a:p>
           <a:p>
@@ -1562,11 +1530,7 @@
             </a:r>
             <a:r>
               <a:rPr lang="en-US" baseline="0" dirty="0" smtClean="0"/>
-              <a:t> http://</a:t>
-            </a:r>
-            <a:r>
-              <a:rPr lang="en-US" baseline="0" dirty="0" smtClean="0"/>
-              <a:t>www.music-software-reviews.com/index.html</a:t>
+              <a:t> http://www.music-software-reviews.com/index.html</a:t>
             </a:r>
           </a:p>
           <a:p>
@@ -1689,11 +1653,7 @@
             </a:r>
             <a:r>
               <a:rPr lang="en-US" baseline="0" dirty="0" smtClean="0"/>
-              <a:t> http://</a:t>
-            </a:r>
-            <a:r>
-              <a:rPr lang="en-US" baseline="0" dirty="0" smtClean="0"/>
-              <a:t>www.musicmall-asia.com/minni/Papers/costam99jtlm.pdf</a:t>
+              <a:t> http://www.musicmall-asia.com/minni/Papers/costam99jtlm.pdf</a:t>
             </a:r>
           </a:p>
           <a:p>
@@ -1833,11 +1793,7 @@
             </a:r>
             <a:r>
               <a:rPr lang="en-US" baseline="0" dirty="0" smtClean="0"/>
-              <a:t>ttp://</a:t>
-            </a:r>
-            <a:r>
-              <a:rPr lang="en-US" baseline="0" dirty="0" smtClean="0"/>
-              <a:t>www.musicmall-asia.com/minni/Papers/costam99jtlm.pdf</a:t>
+              <a:t>ttp://www.musicmall-asia.com/minni/Papers/costam99jtlm.pdf</a:t>
             </a:r>
           </a:p>
           <a:p>
@@ -1993,11 +1949,7 @@
           <a:p>
             <a:r>
               <a:rPr lang="en-US" dirty="0" smtClean="0"/>
-              <a:t>Sources: http://</a:t>
-            </a:r>
-            <a:r>
-              <a:rPr lang="en-US" dirty="0" smtClean="0"/>
-              <a:t>www.music-software-reviews.com/recording_software_tests.html</a:t>
+              <a:t>Sources: http://www.music-software-reviews.com/recording_software_tests.html</a:t>
             </a:r>
           </a:p>
           <a:p>
@@ -2014,6 +1966,80 @@
             <a:r>
               <a:rPr lang="en-US" baseline="0" dirty="0" smtClean="0"/>
               <a:t>Tiffany</a:t>
+            </a:r>
+          </a:p>
+          <a:p>
+            <a:endParaRPr lang="en-US" baseline="0" dirty="0" smtClean="0"/>
+          </a:p>
+          <a:p>
+            <a:r>
+              <a:rPr lang="en-US" baseline="0" dirty="0" smtClean="0"/>
+              <a:t>Audio Timing – All recording system has some delay. Insignificant in analog domain, different story in digital world, problem also called latency Use audio timing to determine how much of a delay.</a:t>
+            </a:r>
+          </a:p>
+          <a:p>
+            <a:r>
+              <a:rPr lang="en-US" baseline="0" dirty="0" smtClean="0"/>
+              <a:t>Midi Timing – Is not as exact as audio tracks. Delays of 1ms and up can be a problem for percussive signals.</a:t>
+            </a:r>
+          </a:p>
+          <a:p>
+            <a:r>
+              <a:rPr lang="en-US" baseline="0" dirty="0" smtClean="0"/>
+              <a:t>Load Testing – How many tracks can the software handle simultaneously?</a:t>
+            </a:r>
+          </a:p>
+          <a:p>
+            <a:endParaRPr lang="en-US" baseline="0" dirty="0" smtClean="0"/>
+          </a:p>
+          <a:p>
+            <a:r>
+              <a:rPr lang="en-US" baseline="0" dirty="0" smtClean="0"/>
+              <a:t>Setup – Does everything work? How easy is it to use and understand?</a:t>
+            </a:r>
+          </a:p>
+          <a:p>
+            <a:r>
+              <a:rPr lang="en-US" baseline="0" dirty="0" smtClean="0"/>
+              <a:t>Recording – How many steps / clicks does it take to record something? Are there any features that might be needed (cycle, loop)</a:t>
+            </a:r>
+          </a:p>
+          <a:p>
+            <a:r>
+              <a:rPr lang="en-US" baseline="0" dirty="0" smtClean="0"/>
+              <a:t>Arrangement – How does the cutting audio work? Is it precise? Is there overlap?</a:t>
+            </a:r>
+          </a:p>
+          <a:p>
+            <a:r>
+              <a:rPr lang="en-US" baseline="0" dirty="0" smtClean="0"/>
+              <a:t>Automation – How easily can things be automated?  (Things such as volume, fade, jump in track, record, </a:t>
+            </a:r>
+            <a:r>
+              <a:rPr lang="en-US" baseline="0" dirty="0" err="1" smtClean="0"/>
+              <a:t>etc</a:t>
+            </a:r>
+            <a:r>
+              <a:rPr lang="en-US" baseline="0" dirty="0" smtClean="0"/>
+              <a:t>)</a:t>
+            </a:r>
+          </a:p>
+          <a:p>
+            <a:r>
+              <a:rPr lang="en-US" baseline="0" dirty="0" smtClean="0"/>
+              <a:t>File Handling – Where are files stored and how secure are they? Can they easily be names and moved? Importing and Exporting.</a:t>
+            </a:r>
+          </a:p>
+          <a:p>
+            <a:r>
+              <a:rPr lang="en-US" baseline="0" dirty="0" smtClean="0"/>
+              <a:t>Libraries – Are there a wide range of templates available?</a:t>
+            </a:r>
+          </a:p>
+          <a:p>
+            <a:r>
+              <a:rPr lang="en-US" baseline="0" dirty="0" smtClean="0"/>
+              <a:t>Intelligence and Ease – Is it easy to build songs? Is it possible to create your own styles?</a:t>
             </a:r>
             <a:endParaRPr lang="en-US" dirty="0"/>
           </a:p>
@@ -2120,11 +2146,7 @@
           <a:p>
             <a:r>
               <a:rPr lang="en-US" dirty="0" smtClean="0"/>
-              <a:t>Sources: http://</a:t>
-            </a:r>
-            <a:r>
-              <a:rPr lang="en-US" dirty="0" smtClean="0"/>
-              <a:t>www.musicmall-asia.com/minni/Papers/costam99jtlm.pdf</a:t>
+              <a:t>Sources: http://www.musicmall-asia.com/minni/Papers/costam99jtlm.pdf</a:t>
             </a:r>
           </a:p>
           <a:p>
@@ -2137,6 +2159,31 @@
             <a:r>
               <a:rPr lang="en-US" dirty="0" smtClean="0"/>
               <a:t>Tiffany</a:t>
+            </a:r>
+          </a:p>
+          <a:p>
+            <a:endParaRPr lang="en-US" dirty="0" smtClean="0"/>
+          </a:p>
+          <a:p>
+            <a:r>
+              <a:rPr lang="en-US" dirty="0" smtClean="0"/>
+              <a:t>Basic testing</a:t>
+            </a:r>
+            <a:r>
+              <a:rPr lang="en-US" baseline="0" dirty="0" smtClean="0"/>
+              <a:t> cycle for music software.</a:t>
+            </a:r>
+          </a:p>
+          <a:p>
+            <a:r>
+              <a:rPr lang="en-US" baseline="0" dirty="0" smtClean="0"/>
+              <a:t>What type of editing are you wanting to do? Determine software that would be ideal for this. </a:t>
+            </a:r>
+          </a:p>
+          <a:p>
+            <a:r>
+              <a:rPr lang="en-US" baseline="0" dirty="0" smtClean="0"/>
+              <a:t>Identify type of wave and frequency.</a:t>
             </a:r>
             <a:endParaRPr lang="en-US" dirty="0"/>
           </a:p>
@@ -2243,11 +2290,7 @@
           <a:p>
             <a:r>
               <a:rPr lang="en-US" dirty="0" smtClean="0"/>
-              <a:t>Sources: http://</a:t>
-            </a:r>
-            <a:r>
-              <a:rPr lang="en-US" dirty="0" smtClean="0"/>
-              <a:t>www.musicmall-asia.com/minni/Papers/costam99jtlm.pdf</a:t>
+              <a:t>Sources: http://www.musicmall-asia.com/minni/Papers/costam99jtlm.pdf</a:t>
             </a:r>
           </a:p>
           <a:p>
@@ -2260,6 +2303,19 @@
             <a:r>
               <a:rPr lang="en-US" dirty="0" smtClean="0"/>
               <a:t>Tiffany</a:t>
+            </a:r>
+          </a:p>
+          <a:p>
+            <a:endParaRPr lang="en-US" dirty="0" smtClean="0"/>
+          </a:p>
+          <a:p>
+            <a:r>
+              <a:rPr lang="en-US" dirty="0" smtClean="0"/>
+              <a:t>I’m just going to go off of this slide. There is</a:t>
+            </a:r>
+            <a:r>
+              <a:rPr lang="en-US" baseline="0" dirty="0" smtClean="0"/>
+              <a:t> a lot of information here that could easily take a minute to cover.</a:t>
             </a:r>
             <a:endParaRPr lang="en-US" dirty="0"/>
           </a:p>
@@ -2370,11 +2426,7 @@
             </a:r>
             <a:r>
               <a:rPr lang="en-US" baseline="0" dirty="0" smtClean="0"/>
-              <a:t> </a:t>
-            </a:r>
-            <a:r>
-              <a:rPr lang="en-US" baseline="0" dirty="0" smtClean="0"/>
-              <a:t>Me</a:t>
+              <a:t> Me</a:t>
             </a:r>
           </a:p>
           <a:p>
@@ -2387,6 +2439,38 @@
             <a:r>
               <a:rPr lang="en-US" baseline="0" dirty="0" smtClean="0"/>
               <a:t>Tiffany</a:t>
+            </a:r>
+          </a:p>
+          <a:p>
+            <a:endParaRPr lang="en-US" baseline="0" dirty="0" smtClean="0"/>
+          </a:p>
+          <a:p>
+            <a:r>
+              <a:rPr lang="en-US" baseline="0" dirty="0" smtClean="0"/>
+              <a:t>1.) Developers should be testing everything throughout the development process.</a:t>
+            </a:r>
+          </a:p>
+          <a:p>
+            <a:r>
+              <a:rPr lang="en-US" baseline="0" dirty="0" smtClean="0"/>
+              <a:t>2.) Involving musicians will help achieve what the customers want. It will also help with the quality of playback.</a:t>
+            </a:r>
+          </a:p>
+          <a:p>
+            <a:r>
+              <a:rPr lang="en-US" baseline="0" dirty="0" smtClean="0"/>
+              <a:t>3.) Provide all needed functionality while keeping the interface in an easy to </a:t>
+            </a:r>
+            <a:r>
+              <a:rPr lang="en-US" baseline="0" smtClean="0"/>
+              <a:t>use state. </a:t>
+            </a:r>
+            <a:endParaRPr lang="en-US" baseline="0" dirty="0" smtClean="0"/>
+          </a:p>
+          <a:p>
+            <a:r>
+              <a:rPr lang="en-US" baseline="0" dirty="0" smtClean="0"/>
+              <a:t>4.) Make sure the product is easy to use, not all people using it will be super technical. </a:t>
             </a:r>
             <a:endParaRPr lang="en-US" dirty="0"/>
           </a:p>
@@ -2493,11 +2577,7 @@
           <a:p>
             <a:r>
               <a:rPr lang="en-US" dirty="0" smtClean="0"/>
-              <a:t>Sources: </a:t>
-            </a:r>
-            <a:r>
-              <a:rPr lang="en-US" dirty="0" smtClean="0"/>
-              <a:t>Me</a:t>
+              <a:t>Sources: Me</a:t>
             </a:r>
           </a:p>
           <a:p>
@@ -2762,7 +2842,7 @@
           <a:p>
             <a:fld id="{6CD4CE4C-F2EE-480E-923D-1187F4C49B3D}" type="datetimeFigureOut">
               <a:rPr lang="en-US" smtClean="0"/>
-              <a:t>5/14/2012</a:t>
+              <a:t>5/15/2012</a:t>
             </a:fld>
             <a:endParaRPr lang="en-US" dirty="0"/>
           </a:p>
@@ -2927,7 +3007,7 @@
           <a:p>
             <a:fld id="{6CD4CE4C-F2EE-480E-923D-1187F4C49B3D}" type="datetimeFigureOut">
               <a:rPr lang="en-US" smtClean="0"/>
-              <a:t>5/14/2012</a:t>
+              <a:t>5/15/2012</a:t>
             </a:fld>
             <a:endParaRPr lang="en-US" dirty="0"/>
           </a:p>
@@ -3102,7 +3182,7 @@
           <a:p>
             <a:fld id="{6CD4CE4C-F2EE-480E-923D-1187F4C49B3D}" type="datetimeFigureOut">
               <a:rPr lang="en-US" smtClean="0"/>
-              <a:t>5/14/2012</a:t>
+              <a:t>5/15/2012</a:t>
             </a:fld>
             <a:endParaRPr lang="en-US" dirty="0"/>
           </a:p>
@@ -3285,7 +3365,7 @@
           <a:p>
             <a:fld id="{6CD4CE4C-F2EE-480E-923D-1187F4C49B3D}" type="datetimeFigureOut">
               <a:rPr lang="en-US" smtClean="0"/>
-              <a:t>5/14/2012</a:t>
+              <a:t>5/15/2012</a:t>
             </a:fld>
             <a:endParaRPr lang="en-US" dirty="0"/>
           </a:p>
@@ -3547,7 +3627,7 @@
           <a:p>
             <a:fld id="{6CD4CE4C-F2EE-480E-923D-1187F4C49B3D}" type="datetimeFigureOut">
               <a:rPr lang="en-US" smtClean="0"/>
-              <a:t>5/14/2012</a:t>
+              <a:t>5/15/2012</a:t>
             </a:fld>
             <a:endParaRPr lang="en-US" dirty="0"/>
           </a:p>
@@ -3895,7 +3975,7 @@
           <a:p>
             <a:fld id="{6CD4CE4C-F2EE-480E-923D-1187F4C49B3D}" type="datetimeFigureOut">
               <a:rPr lang="en-US" smtClean="0"/>
-              <a:t>5/14/2012</a:t>
+              <a:t>5/15/2012</a:t>
             </a:fld>
             <a:endParaRPr lang="en-US" dirty="0"/>
           </a:p>
@@ -4203,7 +4283,7 @@
           <a:p>
             <a:fld id="{6CD4CE4C-F2EE-480E-923D-1187F4C49B3D}" type="datetimeFigureOut">
               <a:rPr lang="en-US" smtClean="0"/>
-              <a:t>5/14/2012</a:t>
+              <a:t>5/15/2012</a:t>
             </a:fld>
             <a:endParaRPr lang="en-US" dirty="0"/>
           </a:p>
@@ -4430,7 +4510,7 @@
           <a:p>
             <a:fld id="{6CD4CE4C-F2EE-480E-923D-1187F4C49B3D}" type="datetimeFigureOut">
               <a:rPr lang="en-US" smtClean="0"/>
-              <a:t>5/14/2012</a:t>
+              <a:t>5/15/2012</a:t>
             </a:fld>
             <a:endParaRPr lang="en-US" dirty="0"/>
           </a:p>
@@ -4520,7 +4600,7 @@
           <a:p>
             <a:fld id="{6CD4CE4C-F2EE-480E-923D-1187F4C49B3D}" type="datetimeFigureOut">
               <a:rPr lang="en-US" smtClean="0"/>
-              <a:t>5/14/2012</a:t>
+              <a:t>5/15/2012</a:t>
             </a:fld>
             <a:endParaRPr lang="en-US" dirty="0"/>
           </a:p>
@@ -4808,7 +4888,7 @@
           <a:p>
             <a:fld id="{6CD4CE4C-F2EE-480E-923D-1187F4C49B3D}" type="datetimeFigureOut">
               <a:rPr lang="en-US" smtClean="0"/>
-              <a:t>5/14/2012</a:t>
+              <a:t>5/15/2012</a:t>
             </a:fld>
             <a:endParaRPr lang="en-US" dirty="0"/>
           </a:p>
@@ -5077,7 +5157,7 @@
           <a:p>
             <a:fld id="{6CD4CE4C-F2EE-480E-923D-1187F4C49B3D}" type="datetimeFigureOut">
               <a:rPr lang="en-US" smtClean="0"/>
-              <a:t>5/14/2012</a:t>
+              <a:t>5/15/2012</a:t>
             </a:fld>
             <a:endParaRPr lang="en-US" dirty="0"/>
           </a:p>
@@ -5287,7 +5367,7 @@
           <a:p>
             <a:fld id="{6CD4CE4C-F2EE-480E-923D-1187F4C49B3D}" type="datetimeFigureOut">
               <a:rPr lang="en-US" smtClean="0"/>
-              <a:t>5/14/2012</a:t>
+              <a:t>5/15/2012</a:t>
             </a:fld>
             <a:endParaRPr lang="en-US" dirty="0"/>
           </a:p>

</xml_diff>